<commit_message>
add 10 things i do for every .net app
</commit_message>
<xml_diff>
--- a/2023-05-04-HealthyHighPerformingEngineeringOrgs/Healthy High Performing Engineering Orgs.pptx
+++ b/2023-05-04-HealthyHighPerformingEngineeringOrgs/Healthy High Performing Engineering Orgs.pptx
@@ -257,7 +257,7 @@
           <a:p>
             <a:fld id="{8EBF47D1-607F-45EE-AE63-C10CF3AC8DD9}" type="datetimeFigureOut">
               <a:rPr lang="en-US" smtClean="0"/>
-              <a:t>5/5/2023</a:t>
+              <a:t>6/17/2023</a:t>
             </a:fld>
             <a:endParaRPr lang="en-US"/>
           </a:p>
@@ -5726,7 +5726,7 @@
           <a:p>
             <a:fld id="{A4BF2526-C75C-47BE-928B-0135A92A66BE}" type="datetimeFigureOut">
               <a:rPr lang="en-US" smtClean="0"/>
-              <a:t>5/5/2023</a:t>
+              <a:t>6/17/2023</a:t>
             </a:fld>
             <a:endParaRPr lang="en-US"/>
           </a:p>
@@ -5924,7 +5924,7 @@
           <a:p>
             <a:fld id="{A4BF2526-C75C-47BE-928B-0135A92A66BE}" type="datetimeFigureOut">
               <a:rPr lang="en-US" smtClean="0"/>
-              <a:t>5/5/2023</a:t>
+              <a:t>6/17/2023</a:t>
             </a:fld>
             <a:endParaRPr lang="en-US"/>
           </a:p>
@@ -6132,7 +6132,7 @@
           <a:p>
             <a:fld id="{A4BF2526-C75C-47BE-928B-0135A92A66BE}" type="datetimeFigureOut">
               <a:rPr lang="en-US" smtClean="0"/>
-              <a:t>5/5/2023</a:t>
+              <a:t>6/17/2023</a:t>
             </a:fld>
             <a:endParaRPr lang="en-US"/>
           </a:p>
@@ -6330,7 +6330,7 @@
           <a:p>
             <a:fld id="{A4BF2526-C75C-47BE-928B-0135A92A66BE}" type="datetimeFigureOut">
               <a:rPr lang="en-US" smtClean="0"/>
-              <a:t>5/5/2023</a:t>
+              <a:t>6/17/2023</a:t>
             </a:fld>
             <a:endParaRPr lang="en-US"/>
           </a:p>
@@ -6605,7 +6605,7 @@
           <a:p>
             <a:fld id="{A4BF2526-C75C-47BE-928B-0135A92A66BE}" type="datetimeFigureOut">
               <a:rPr lang="en-US" smtClean="0"/>
-              <a:t>5/5/2023</a:t>
+              <a:t>6/17/2023</a:t>
             </a:fld>
             <a:endParaRPr lang="en-US"/>
           </a:p>
@@ -6870,7 +6870,7 @@
           <a:p>
             <a:fld id="{A4BF2526-C75C-47BE-928B-0135A92A66BE}" type="datetimeFigureOut">
               <a:rPr lang="en-US" smtClean="0"/>
-              <a:t>5/5/2023</a:t>
+              <a:t>6/17/2023</a:t>
             </a:fld>
             <a:endParaRPr lang="en-US"/>
           </a:p>
@@ -7282,7 +7282,7 @@
           <a:p>
             <a:fld id="{A4BF2526-C75C-47BE-928B-0135A92A66BE}" type="datetimeFigureOut">
               <a:rPr lang="en-US" smtClean="0"/>
-              <a:t>5/5/2023</a:t>
+              <a:t>6/17/2023</a:t>
             </a:fld>
             <a:endParaRPr lang="en-US"/>
           </a:p>
@@ -7423,7 +7423,7 @@
           <a:p>
             <a:fld id="{A4BF2526-C75C-47BE-928B-0135A92A66BE}" type="datetimeFigureOut">
               <a:rPr lang="en-US" smtClean="0"/>
-              <a:t>5/5/2023</a:t>
+              <a:t>6/17/2023</a:t>
             </a:fld>
             <a:endParaRPr lang="en-US"/>
           </a:p>
@@ -7536,7 +7536,7 @@
           <a:p>
             <a:fld id="{A4BF2526-C75C-47BE-928B-0135A92A66BE}" type="datetimeFigureOut">
               <a:rPr lang="en-US" smtClean="0"/>
-              <a:t>5/5/2023</a:t>
+              <a:t>6/17/2023</a:t>
             </a:fld>
             <a:endParaRPr lang="en-US"/>
           </a:p>
@@ -7847,7 +7847,7 @@
           <a:p>
             <a:fld id="{A4BF2526-C75C-47BE-928B-0135A92A66BE}" type="datetimeFigureOut">
               <a:rPr lang="en-US" smtClean="0"/>
-              <a:t>5/5/2023</a:t>
+              <a:t>6/17/2023</a:t>
             </a:fld>
             <a:endParaRPr lang="en-US"/>
           </a:p>
@@ -8135,7 +8135,7 @@
           <a:p>
             <a:fld id="{A4BF2526-C75C-47BE-928B-0135A92A66BE}" type="datetimeFigureOut">
               <a:rPr lang="en-US" smtClean="0"/>
-              <a:t>5/5/2023</a:t>
+              <a:t>6/17/2023</a:t>
             </a:fld>
             <a:endParaRPr lang="en-US"/>
           </a:p>
@@ -8376,7 +8376,7 @@
           <a:p>
             <a:fld id="{A4BF2526-C75C-47BE-928B-0135A92A66BE}" type="datetimeFigureOut">
               <a:rPr lang="en-US" smtClean="0"/>
-              <a:t>5/5/2023</a:t>
+              <a:t>6/17/2023</a:t>
             </a:fld>
             <a:endParaRPr lang="en-US"/>
           </a:p>
@@ -8819,37 +8819,16 @@
         </p:nvSpPr>
         <p:spPr>
           <a:xfrm>
-            <a:off x="1" y="2210990"/>
-            <a:ext cx="12192000" cy="3226965"/>
+            <a:off x="0" y="34670"/>
+            <a:ext cx="12192000" cy="5123066"/>
           </a:xfrm>
         </p:spPr>
         <p:txBody>
           <a:bodyPr>
-            <a:normAutofit fontScale="90000"/>
+            <a:normAutofit/>
           </a:bodyPr>
           <a:lstStyle/>
           <a:p>
-            <a:r>
-              <a:rPr lang="en-US" sz="7700" b="1" dirty="0">
-                <a:solidFill>
-                  <a:schemeClr val="bg1"/>
-                </a:solidFill>
-                <a:latin typeface="+mn-lt"/>
-                <a:ea typeface="Open Sans" panose="020B0606030504020204" pitchFamily="34" charset="0"/>
-                <a:cs typeface="Open Sans" panose="020B0606030504020204" pitchFamily="34" charset="0"/>
-              </a:rPr>
-              <a:t>Avoid the Dark Side:</a:t>
-            </a:r>
-            <a:br>
-              <a:rPr lang="en-US" sz="7700" b="1" dirty="0">
-                <a:solidFill>
-                  <a:schemeClr val="bg1"/>
-                </a:solidFill>
-                <a:latin typeface="+mn-lt"/>
-                <a:ea typeface="Open Sans" panose="020B0606030504020204" pitchFamily="34" charset="0"/>
-                <a:cs typeface="Open Sans" panose="020B0606030504020204" pitchFamily="34" charset="0"/>
-              </a:rPr>
-            </a:br>
             <a:r>
               <a:rPr lang="en-US" sz="7700" b="1" dirty="0">
                 <a:solidFill>
@@ -35287,53 +35266,6 @@
           </a:p>
         </p:txBody>
       </p:sp>
-      <p:pic>
-        <p:nvPicPr>
-          <p:cNvPr id="5122" name="Picture 2" descr="Force Choke | The Evil Wiki | Fandom">
-            <a:extLst>
-              <a:ext uri="{FF2B5EF4-FFF2-40B4-BE49-F238E27FC236}">
-                <a16:creationId xmlns:a16="http://schemas.microsoft.com/office/drawing/2014/main" id="{E905BC00-07F8-A759-F783-05D25321B908}"/>
-              </a:ext>
-            </a:extLst>
-          </p:cNvPr>
-          <p:cNvPicPr>
-            <a:picLocks noChangeAspect="1" noChangeArrowheads="1"/>
-          </p:cNvPicPr>
-          <p:nvPr/>
-        </p:nvPicPr>
-        <p:blipFill>
-          <a:blip r:embed="rId3">
-            <a:extLst>
-              <a:ext uri="{28A0092B-C50C-407E-A947-70E740481C1C}">
-                <a14:useLocalDpi xmlns:a14="http://schemas.microsoft.com/office/drawing/2010/main" val="0"/>
-              </a:ext>
-            </a:extLst>
-          </a:blip>
-          <a:srcRect/>
-          <a:stretch>
-            <a:fillRect/>
-          </a:stretch>
-        </p:blipFill>
-        <p:spPr bwMode="auto">
-          <a:xfrm>
-            <a:off x="2587810" y="1636900"/>
-            <a:ext cx="6525995" cy="4474968"/>
-          </a:xfrm>
-          <a:prstGeom prst="rect">
-            <a:avLst/>
-          </a:prstGeom>
-          <a:noFill/>
-          <a:extLst>
-            <a:ext uri="{909E8E84-426E-40DD-AFC4-6F175D3DCCD1}">
-              <a14:hiddenFill xmlns:a14="http://schemas.microsoft.com/office/drawing/2010/main">
-                <a:solidFill>
-                  <a:srgbClr val="FFFFFF"/>
-                </a:solidFill>
-              </a14:hiddenFill>
-            </a:ext>
-          </a:extLst>
-        </p:spPr>
-      </p:pic>
     </p:spTree>
     <p:extLst>
       <p:ext uri="{BB962C8B-B14F-4D97-AF65-F5344CB8AC3E}">
@@ -35527,7 +35459,7 @@
                             </p:stCondLst>
                             <p:childTnLst>
                               <p:par>
-                                <p:cTn id="15" presetID="10" presetClass="entr" presetSubtype="0" fill="hold" nodeType="clickEffect">
+                                <p:cTn id="15" presetID="10" presetClass="entr" presetSubtype="0" fill="hold" grpId="0" nodeType="clickEffect">
                                   <p:stCondLst>
                                     <p:cond delay="0"/>
                                   </p:stCondLst>
@@ -35540,7 +35472,11 @@
                                           </p:stCondLst>
                                         </p:cTn>
                                         <p:tgtEl>
-                                          <p:spTgt spid="5122"/>
+                                          <p:spTgt spid="3">
+                                            <p:txEl>
+                                              <p:pRg st="2" end="2"/>
+                                            </p:txEl>
+                                          </p:spTgt>
                                         </p:tgtEl>
                                         <p:attrNameLst>
                                           <p:attrName>style.visibility</p:attrName>
@@ -35554,26 +35490,34 @@
                                       <p:cBhvr>
                                         <p:cTn id="17" dur="500"/>
                                         <p:tgtEl>
-                                          <p:spTgt spid="5122"/>
+                                          <p:spTgt spid="3">
+                                            <p:txEl>
+                                              <p:pRg st="2" end="2"/>
+                                            </p:txEl>
+                                          </p:spTgt>
                                         </p:tgtEl>
                                       </p:cBhvr>
                                     </p:animEffect>
                                   </p:childTnLst>
                                   <p:subTnLst>
-                                    <p:set>
+                                    <p:animClr clrSpc="rgb" dir="cw">
                                       <p:cBhvr override="childStyle">
                                         <p:cTn dur="1" fill="hold" display="0" masterRel="nextClick" afterEffect="1"/>
                                         <p:tgtEl>
-                                          <p:spTgt spid="5122"/>
+                                          <p:spTgt spid="3">
+                                            <p:txEl>
+                                              <p:pRg st="2" end="2"/>
+                                            </p:txEl>
+                                          </p:spTgt>
                                         </p:tgtEl>
                                         <p:attrNameLst>
-                                          <p:attrName>style.visibility</p:attrName>
+                                          <p:attrName>ppt_c</p:attrName>
                                         </p:attrNameLst>
                                       </p:cBhvr>
                                       <p:to>
-                                        <p:strVal val="hidden"/>
+                                        <a:srgbClr val="B2B2B2"/>
                                       </p:to>
-                                    </p:set>
+                                    </p:animClr>
                                   </p:subTnLst>
                                 </p:cTn>
                               </p:par>
@@ -35611,7 +35555,7 @@
                                         <p:tgtEl>
                                           <p:spTgt spid="3">
                                             <p:txEl>
-                                              <p:pRg st="2" end="2"/>
+                                              <p:pRg st="3" end="3"/>
                                             </p:txEl>
                                           </p:spTgt>
                                         </p:tgtEl>
@@ -35626,87 +35570,6 @@
                                     <p:animEffect transition="in" filter="fade">
                                       <p:cBhvr>
                                         <p:cTn id="22" dur="500"/>
-                                        <p:tgtEl>
-                                          <p:spTgt spid="3">
-                                            <p:txEl>
-                                              <p:pRg st="2" end="2"/>
-                                            </p:txEl>
-                                          </p:spTgt>
-                                        </p:tgtEl>
-                                      </p:cBhvr>
-                                    </p:animEffect>
-                                  </p:childTnLst>
-                                  <p:subTnLst>
-                                    <p:animClr clrSpc="rgb" dir="cw">
-                                      <p:cBhvr override="childStyle">
-                                        <p:cTn dur="1" fill="hold" display="0" masterRel="nextClick" afterEffect="1"/>
-                                        <p:tgtEl>
-                                          <p:spTgt spid="3">
-                                            <p:txEl>
-                                              <p:pRg st="2" end="2"/>
-                                            </p:txEl>
-                                          </p:spTgt>
-                                        </p:tgtEl>
-                                        <p:attrNameLst>
-                                          <p:attrName>ppt_c</p:attrName>
-                                        </p:attrNameLst>
-                                      </p:cBhvr>
-                                      <p:to>
-                                        <a:srgbClr val="B2B2B2"/>
-                                      </p:to>
-                                    </p:animClr>
-                                  </p:subTnLst>
-                                </p:cTn>
-                              </p:par>
-                            </p:childTnLst>
-                          </p:cTn>
-                        </p:par>
-                      </p:childTnLst>
-                    </p:cTn>
-                  </p:par>
-                  <p:par>
-                    <p:cTn id="23" fill="hold">
-                      <p:stCondLst>
-                        <p:cond delay="indefinite"/>
-                      </p:stCondLst>
-                      <p:childTnLst>
-                        <p:par>
-                          <p:cTn id="24" fill="hold">
-                            <p:stCondLst>
-                              <p:cond delay="0"/>
-                            </p:stCondLst>
-                            <p:childTnLst>
-                              <p:par>
-                                <p:cTn id="25" presetID="10" presetClass="entr" presetSubtype="0" fill="hold" grpId="0" nodeType="clickEffect">
-                                  <p:stCondLst>
-                                    <p:cond delay="0"/>
-                                  </p:stCondLst>
-                                  <p:childTnLst>
-                                    <p:set>
-                                      <p:cBhvr>
-                                        <p:cTn id="26" dur="1" fill="hold">
-                                          <p:stCondLst>
-                                            <p:cond delay="0"/>
-                                          </p:stCondLst>
-                                        </p:cTn>
-                                        <p:tgtEl>
-                                          <p:spTgt spid="3">
-                                            <p:txEl>
-                                              <p:pRg st="3" end="3"/>
-                                            </p:txEl>
-                                          </p:spTgt>
-                                        </p:tgtEl>
-                                        <p:attrNameLst>
-                                          <p:attrName>style.visibility</p:attrName>
-                                        </p:attrNameLst>
-                                      </p:cBhvr>
-                                      <p:to>
-                                        <p:strVal val="visible"/>
-                                      </p:to>
-                                    </p:set>
-                                    <p:animEffect transition="in" filter="fade">
-                                      <p:cBhvr>
-                                        <p:cTn id="27" dur="500"/>
                                         <p:tgtEl>
                                           <p:spTgt spid="3">
                                             <p:txEl>

</xml_diff>